<commit_message>
add workflow for experiment 12
</commit_message>
<xml_diff>
--- a/slides/poster_dkm_2025.pptx
+++ b/slides/poster_dkm_2025.pptx
@@ -204,7 +204,7 @@
           <a:p>
             <a:fld id="{CE2790AF-E7AC-1649-870D-E6E220A7D867}" type="datetimeFigureOut">
               <a:rPr lang="en-FR" smtClean="0"/>
-              <a:t>27/02/2025</a:t>
+              <a:t>02/03/2025</a:t>
             </a:fld>
             <a:endParaRPr lang="en-FR"/>
           </a:p>
@@ -777,7 +777,7 @@
           <a:p>
             <a:fld id="{44CE02EC-038A-2644-833A-9BCCD101A1FB}" type="datetimeFigureOut">
               <a:rPr lang="en-FR" smtClean="0"/>
-              <a:t>27/02/2025</a:t>
+              <a:t>02/03/2025</a:t>
             </a:fld>
             <a:endParaRPr lang="en-FR"/>
           </a:p>
@@ -947,7 +947,7 @@
           <a:p>
             <a:fld id="{44CE02EC-038A-2644-833A-9BCCD101A1FB}" type="datetimeFigureOut">
               <a:rPr lang="en-FR" smtClean="0"/>
-              <a:t>27/02/2025</a:t>
+              <a:t>02/03/2025</a:t>
             </a:fld>
             <a:endParaRPr lang="en-FR"/>
           </a:p>
@@ -1127,7 +1127,7 @@
           <a:p>
             <a:fld id="{44CE02EC-038A-2644-833A-9BCCD101A1FB}" type="datetimeFigureOut">
               <a:rPr lang="en-FR" smtClean="0"/>
-              <a:t>27/02/2025</a:t>
+              <a:t>02/03/2025</a:t>
             </a:fld>
             <a:endParaRPr lang="en-FR"/>
           </a:p>
@@ -1297,7 +1297,7 @@
           <a:p>
             <a:fld id="{44CE02EC-038A-2644-833A-9BCCD101A1FB}" type="datetimeFigureOut">
               <a:rPr lang="en-FR" smtClean="0"/>
-              <a:t>27/02/2025</a:t>
+              <a:t>02/03/2025</a:t>
             </a:fld>
             <a:endParaRPr lang="en-FR"/>
           </a:p>
@@ -1541,7 +1541,7 @@
           <a:p>
             <a:fld id="{44CE02EC-038A-2644-833A-9BCCD101A1FB}" type="datetimeFigureOut">
               <a:rPr lang="en-FR" smtClean="0"/>
-              <a:t>27/02/2025</a:t>
+              <a:t>02/03/2025</a:t>
             </a:fld>
             <a:endParaRPr lang="en-FR"/>
           </a:p>
@@ -1773,7 +1773,7 @@
           <a:p>
             <a:fld id="{44CE02EC-038A-2644-833A-9BCCD101A1FB}" type="datetimeFigureOut">
               <a:rPr lang="en-FR" smtClean="0"/>
-              <a:t>27/02/2025</a:t>
+              <a:t>02/03/2025</a:t>
             </a:fld>
             <a:endParaRPr lang="en-FR"/>
           </a:p>
@@ -2140,7 +2140,7 @@
           <a:p>
             <a:fld id="{44CE02EC-038A-2644-833A-9BCCD101A1FB}" type="datetimeFigureOut">
               <a:rPr lang="en-FR" smtClean="0"/>
-              <a:t>27/02/2025</a:t>
+              <a:t>02/03/2025</a:t>
             </a:fld>
             <a:endParaRPr lang="en-FR"/>
           </a:p>
@@ -2258,7 +2258,7 @@
           <a:p>
             <a:fld id="{44CE02EC-038A-2644-833A-9BCCD101A1FB}" type="datetimeFigureOut">
               <a:rPr lang="en-FR" smtClean="0"/>
-              <a:t>27/02/2025</a:t>
+              <a:t>02/03/2025</a:t>
             </a:fld>
             <a:endParaRPr lang="en-FR"/>
           </a:p>
@@ -2353,7 +2353,7 @@
           <a:p>
             <a:fld id="{44CE02EC-038A-2644-833A-9BCCD101A1FB}" type="datetimeFigureOut">
               <a:rPr lang="en-FR" smtClean="0"/>
-              <a:t>27/02/2025</a:t>
+              <a:t>02/03/2025</a:t>
             </a:fld>
             <a:endParaRPr lang="en-FR"/>
           </a:p>
@@ -2630,7 +2630,7 @@
           <a:p>
             <a:fld id="{44CE02EC-038A-2644-833A-9BCCD101A1FB}" type="datetimeFigureOut">
               <a:rPr lang="en-FR" smtClean="0"/>
-              <a:t>27/02/2025</a:t>
+              <a:t>02/03/2025</a:t>
             </a:fld>
             <a:endParaRPr lang="en-FR"/>
           </a:p>
@@ -2887,7 +2887,7 @@
           <a:p>
             <a:fld id="{44CE02EC-038A-2644-833A-9BCCD101A1FB}" type="datetimeFigureOut">
               <a:rPr lang="en-FR" smtClean="0"/>
-              <a:t>27/02/2025</a:t>
+              <a:t>02/03/2025</a:t>
             </a:fld>
             <a:endParaRPr lang="en-FR"/>
           </a:p>
@@ -3100,7 +3100,7 @@
           <a:p>
             <a:fld id="{44CE02EC-038A-2644-833A-9BCCD101A1FB}" type="datetimeFigureOut">
               <a:rPr lang="en-FR" smtClean="0"/>
-              <a:t>27/02/2025</a:t>
+              <a:t>02/03/2025</a:t>
             </a:fld>
             <a:endParaRPr lang="en-FR"/>
           </a:p>
@@ -10373,7 +10373,12 @@
             <p:ph type="title"/>
           </p:nvPr>
         </p:nvSpPr>
-        <p:spPr/>
+        <p:spPr>
+          <a:xfrm>
+            <a:off x="2081421" y="2278913"/>
+            <a:ext cx="26112371" cy="8273416"/>
+          </a:xfrm>
+        </p:spPr>
         <p:txBody>
           <a:bodyPr/>
           <a:lstStyle/>
@@ -10386,56 +10391,6 @@
           </a:p>
         </p:txBody>
       </p:sp>
-      <p:pic>
-        <p:nvPicPr>
-          <p:cNvPr id="3" name="Picture 6">
-            <a:extLst>
-              <a:ext uri="{FF2B5EF4-FFF2-40B4-BE49-F238E27FC236}">
-                <a16:creationId xmlns:a16="http://schemas.microsoft.com/office/drawing/2014/main" id="{441D9BC8-252E-8C32-317F-E3F6B8FC3711}"/>
-              </a:ext>
-            </a:extLst>
-          </p:cNvPr>
-          <p:cNvPicPr>
-            <a:picLocks noChangeAspect="1" noChangeArrowheads="1"/>
-          </p:cNvPicPr>
-          <p:nvPr/>
-        </p:nvPicPr>
-        <p:blipFill rotWithShape="1">
-          <a:blip r:embed="rId2">
-            <a:extLst>
-              <a:ext uri="{28A0092B-C50C-407E-A947-70E740481C1C}">
-                <a14:useLocalDpi xmlns:a14="http://schemas.microsoft.com/office/drawing/2010/main" val="0"/>
-              </a:ext>
-            </a:extLst>
-          </a:blip>
-          <a:srcRect t="13313" b="3224"/>
-          <a:stretch/>
-        </p:blipFill>
-        <p:spPr bwMode="auto">
-          <a:xfrm>
-            <a:off x="4239443" y="11056017"/>
-            <a:ext cx="21796325" cy="12587755"/>
-          </a:xfrm>
-          <a:prstGeom prst="rect">
-            <a:avLst/>
-          </a:prstGeom>
-          <a:noFill/>
-          <a:ln>
-            <a:solidFill>
-              <a:schemeClr val="tx1"/>
-            </a:solidFill>
-          </a:ln>
-          <a:extLst>
-            <a:ext uri="{909E8E84-426E-40DD-AFC4-6F175D3DCCD1}">
-              <a14:hiddenFill xmlns:a14="http://schemas.microsoft.com/office/drawing/2010/main">
-                <a:solidFill>
-                  <a:srgbClr val="FFFFFF"/>
-                </a:solidFill>
-              </a14:hiddenFill>
-            </a:ext>
-          </a:extLst>
-        </p:spPr>
-      </p:pic>
       <p:sp>
         <p:nvSpPr>
           <p:cNvPr id="4" name="TextBox 3">
@@ -10450,7 +10405,7 @@
         </p:nvSpPr>
         <p:spPr>
           <a:xfrm>
-            <a:off x="4239442" y="25519058"/>
+            <a:off x="4239444" y="25976258"/>
             <a:ext cx="21796325" cy="6001643"/>
           </a:xfrm>
           <a:prstGeom prst="rect">
@@ -10534,7 +10489,7 @@
         </p:nvSpPr>
         <p:spPr>
           <a:xfrm>
-            <a:off x="4239442" y="33395987"/>
+            <a:off x="4536148" y="33395987"/>
             <a:ext cx="21202917" cy="3046988"/>
           </a:xfrm>
           <a:prstGeom prst="rect">
@@ -10559,70 +10514,141 @@
           </a:p>
         </p:txBody>
       </p:sp>
-      <p:sp>
-        <p:nvSpPr>
-          <p:cNvPr id="9" name="TextBox 8">
+      <p:grpSp>
+        <p:nvGrpSpPr>
+          <p:cNvPr id="2" name="Group 1">
             <a:extLst>
               <a:ext uri="{FF2B5EF4-FFF2-40B4-BE49-F238E27FC236}">
-                <a16:creationId xmlns:a16="http://schemas.microsoft.com/office/drawing/2014/main" id="{35358DC6-B077-2CB1-F632-9086611B116B}"/>
+                <a16:creationId xmlns:a16="http://schemas.microsoft.com/office/drawing/2014/main" id="{C35CC4A9-2C0B-63F6-8D4A-E940FC81DF8F}"/>
               </a:ext>
             </a:extLst>
           </p:cNvPr>
-          <p:cNvSpPr txBox="1"/>
+          <p:cNvGrpSpPr/>
           <p:nvPr/>
-        </p:nvSpPr>
-        <p:spPr>
+        </p:nvGrpSpPr>
+        <p:grpSpPr>
           <a:xfrm>
-            <a:off x="4799196" y="11602364"/>
-            <a:ext cx="14925718" cy="2308324"/>
+            <a:off x="4239444" y="11970416"/>
+            <a:ext cx="21796325" cy="12587755"/>
+            <a:chOff x="4239444" y="13833621"/>
+            <a:chExt cx="21796325" cy="12587755"/>
           </a:xfrm>
-          <a:prstGeom prst="rect">
-            <a:avLst/>
-          </a:prstGeom>
-          <a:ln/>
-        </p:spPr>
-        <p:style>
-          <a:lnRef idx="2">
-            <a:schemeClr val="dk1"/>
-          </a:lnRef>
-          <a:fillRef idx="1">
-            <a:schemeClr val="lt1"/>
-          </a:fillRef>
-          <a:effectRef idx="0">
-            <a:schemeClr val="dk1"/>
-          </a:effectRef>
-          <a:fontRef idx="minor">
-            <a:schemeClr val="dk1"/>
-          </a:fontRef>
-        </p:style>
-        <p:txBody>
-          <a:bodyPr wrap="square" rtlCol="0">
-            <a:spAutoFit/>
-          </a:bodyPr>
-          <a:lstStyle/>
-          <a:p>
-            <a:pPr algn="ctr"/>
-            <a:r>
-              <a:rPr lang="en-FR" sz="7200" dirty="0">
-                <a:cs typeface="Arial" panose="020B0604020202020204" pitchFamily="34" charset="0"/>
-              </a:rPr>
-              <a:t>Fast Growth of Bacteria Genome Collection</a:t>
-            </a:r>
-            <a:r>
-              <a:rPr lang="en-FR" sz="7200" baseline="30000" dirty="0">
-                <a:cs typeface="Arial" panose="020B0604020202020204" pitchFamily="34" charset="0"/>
-              </a:rPr>
-              <a:t>[1]</a:t>
-            </a:r>
-            <a:r>
-              <a:rPr lang="en-FR" sz="7200" dirty="0">
-                <a:cs typeface="Arial" panose="020B0604020202020204" pitchFamily="34" charset="0"/>
-              </a:rPr>
-              <a:t> </a:t>
-            </a:r>
-          </a:p>
-        </p:txBody>
-      </p:sp>
+        </p:grpSpPr>
+        <p:pic>
+          <p:nvPicPr>
+            <p:cNvPr id="3" name="Picture 6">
+              <a:extLst>
+                <a:ext uri="{FF2B5EF4-FFF2-40B4-BE49-F238E27FC236}">
+                  <a16:creationId xmlns:a16="http://schemas.microsoft.com/office/drawing/2014/main" id="{441D9BC8-252E-8C32-317F-E3F6B8FC3711}"/>
+                </a:ext>
+              </a:extLst>
+            </p:cNvPr>
+            <p:cNvPicPr>
+              <a:picLocks noChangeAspect="1" noChangeArrowheads="1"/>
+            </p:cNvPicPr>
+            <p:nvPr/>
+          </p:nvPicPr>
+          <p:blipFill rotWithShape="1">
+            <a:blip r:embed="rId2">
+              <a:extLst>
+                <a:ext uri="{28A0092B-C50C-407E-A947-70E740481C1C}">
+                  <a14:useLocalDpi xmlns:a14="http://schemas.microsoft.com/office/drawing/2010/main" val="0"/>
+                </a:ext>
+              </a:extLst>
+            </a:blip>
+            <a:srcRect t="13313" b="3224"/>
+            <a:stretch/>
+          </p:blipFill>
+          <p:spPr bwMode="auto">
+            <a:xfrm>
+              <a:off x="4239444" y="13833621"/>
+              <a:ext cx="21796325" cy="12587755"/>
+            </a:xfrm>
+            <a:prstGeom prst="rect">
+              <a:avLst/>
+            </a:prstGeom>
+            <a:noFill/>
+            <a:ln>
+              <a:solidFill>
+                <a:schemeClr val="tx1"/>
+              </a:solidFill>
+            </a:ln>
+            <a:extLst>
+              <a:ext uri="{909E8E84-426E-40DD-AFC4-6F175D3DCCD1}">
+                <a14:hiddenFill xmlns:a14="http://schemas.microsoft.com/office/drawing/2010/main">
+                  <a:solidFill>
+                    <a:srgbClr val="FFFFFF"/>
+                  </a:solidFill>
+                </a14:hiddenFill>
+              </a:ext>
+            </a:extLst>
+          </p:spPr>
+        </p:pic>
+        <p:sp>
+          <p:nvSpPr>
+            <p:cNvPr id="9" name="TextBox 8">
+              <a:extLst>
+                <a:ext uri="{FF2B5EF4-FFF2-40B4-BE49-F238E27FC236}">
+                  <a16:creationId xmlns:a16="http://schemas.microsoft.com/office/drawing/2014/main" id="{35358DC6-B077-2CB1-F632-9086611B116B}"/>
+                </a:ext>
+              </a:extLst>
+            </p:cNvPr>
+            <p:cNvSpPr txBox="1"/>
+            <p:nvPr/>
+          </p:nvSpPr>
+          <p:spPr>
+            <a:xfrm>
+              <a:off x="5350647" y="14124913"/>
+              <a:ext cx="14925718" cy="2308324"/>
+            </a:xfrm>
+            <a:prstGeom prst="rect">
+              <a:avLst/>
+            </a:prstGeom>
+            <a:ln/>
+          </p:spPr>
+          <p:style>
+            <a:lnRef idx="2">
+              <a:schemeClr val="dk1"/>
+            </a:lnRef>
+            <a:fillRef idx="1">
+              <a:schemeClr val="lt1"/>
+            </a:fillRef>
+            <a:effectRef idx="0">
+              <a:schemeClr val="dk1"/>
+            </a:effectRef>
+            <a:fontRef idx="minor">
+              <a:schemeClr val="dk1"/>
+            </a:fontRef>
+          </p:style>
+          <p:txBody>
+            <a:bodyPr wrap="square" rtlCol="0">
+              <a:spAutoFit/>
+            </a:bodyPr>
+            <a:lstStyle/>
+            <a:p>
+              <a:pPr algn="ctr"/>
+              <a:r>
+                <a:rPr lang="en-FR" sz="7200" dirty="0">
+                  <a:cs typeface="Arial" panose="020B0604020202020204" pitchFamily="34" charset="0"/>
+                </a:rPr>
+                <a:t>Fast Growth of Bacteria Genome Collection</a:t>
+              </a:r>
+              <a:r>
+                <a:rPr lang="en-FR" sz="7200" baseline="30000" dirty="0">
+                  <a:cs typeface="Arial" panose="020B0604020202020204" pitchFamily="34" charset="0"/>
+                </a:rPr>
+                <a:t>[1]</a:t>
+              </a:r>
+              <a:r>
+                <a:rPr lang="en-FR" sz="7200" dirty="0">
+                  <a:cs typeface="Arial" panose="020B0604020202020204" pitchFamily="34" charset="0"/>
+                </a:rPr>
+                <a:t> </a:t>
+              </a:r>
+            </a:p>
+          </p:txBody>
+        </p:sp>
+      </p:grpSp>
     </p:spTree>
     <p:extLst>
       <p:ext uri="{BB962C8B-B14F-4D97-AF65-F5344CB8AC3E}">
@@ -10701,7 +10727,7 @@
         </p:nvGrpSpPr>
         <p:grpSpPr>
           <a:xfrm>
-            <a:off x="4140822" y="9028627"/>
+            <a:off x="4140822" y="9181606"/>
             <a:ext cx="21993566" cy="12858839"/>
             <a:chOff x="8912653" y="4715368"/>
             <a:chExt cx="8970042" cy="5237459"/>
@@ -12092,266 +12118,308 @@
           </p:txBody>
         </p:sp>
       </p:grpSp>
-      <p:pic>
-        <p:nvPicPr>
-          <p:cNvPr id="30" name="Picture 29">
+      <p:grpSp>
+        <p:nvGrpSpPr>
+          <p:cNvPr id="3" name="Group 2">
             <a:extLst>
               <a:ext uri="{FF2B5EF4-FFF2-40B4-BE49-F238E27FC236}">
-                <a16:creationId xmlns:a16="http://schemas.microsoft.com/office/drawing/2014/main" id="{E96E2D1E-E21D-42BE-2DC0-A9822160D2FD}"/>
+                <a16:creationId xmlns:a16="http://schemas.microsoft.com/office/drawing/2014/main" id="{B7277633-4E33-F4DF-D042-67679C57AB91}"/>
               </a:ext>
             </a:extLst>
           </p:cNvPr>
-          <p:cNvPicPr>
-            <a:picLocks noChangeAspect="1"/>
-          </p:cNvPicPr>
+          <p:cNvGrpSpPr/>
           <p:nvPr/>
-        </p:nvPicPr>
-        <p:blipFill>
-          <a:blip r:embed="rId3"/>
-          <a:srcRect l="547" t="3112" r="2304" b="2883"/>
-          <a:stretch/>
-        </p:blipFill>
-        <p:spPr>
+        </p:nvGrpSpPr>
+        <p:grpSpPr>
           <a:xfrm>
-            <a:off x="1917861" y="26232918"/>
-            <a:ext cx="12818997" cy="10774280"/>
+            <a:off x="1167760" y="23744322"/>
+            <a:ext cx="14552848" cy="14795061"/>
+            <a:chOff x="1167760" y="24587932"/>
+            <a:chExt cx="14552848" cy="14795061"/>
           </a:xfrm>
-          <a:prstGeom prst="rect">
-            <a:avLst/>
-          </a:prstGeom>
-          <a:ln>
+        </p:grpSpPr>
+        <p:pic>
+          <p:nvPicPr>
+            <p:cNvPr id="30" name="Picture 29">
+              <a:extLst>
+                <a:ext uri="{FF2B5EF4-FFF2-40B4-BE49-F238E27FC236}">
+                  <a16:creationId xmlns:a16="http://schemas.microsoft.com/office/drawing/2014/main" id="{E96E2D1E-E21D-42BE-2DC0-A9822160D2FD}"/>
+                </a:ext>
+              </a:extLst>
+            </p:cNvPr>
+            <p:cNvPicPr>
+              <a:picLocks noChangeAspect="1"/>
+            </p:cNvPicPr>
+            <p:nvPr/>
+          </p:nvPicPr>
+          <p:blipFill>
+            <a:blip r:embed="rId3"/>
+            <a:srcRect l="547" t="3112" r="2304" b="2883"/>
+            <a:stretch/>
+          </p:blipFill>
+          <p:spPr>
+            <a:xfrm>
+              <a:off x="1917861" y="26090491"/>
+              <a:ext cx="12818997" cy="10774280"/>
+            </a:xfrm>
+            <a:prstGeom prst="rect">
+              <a:avLst/>
+            </a:prstGeom>
+            <a:ln>
+              <a:solidFill>
+                <a:schemeClr val="tx1"/>
+              </a:solidFill>
+            </a:ln>
+          </p:spPr>
+        </p:pic>
+        <p:sp>
+          <p:nvSpPr>
+            <p:cNvPr id="31" name="TextBox 30">
+              <a:extLst>
+                <a:ext uri="{FF2B5EF4-FFF2-40B4-BE49-F238E27FC236}">
+                  <a16:creationId xmlns:a16="http://schemas.microsoft.com/office/drawing/2014/main" id="{ABE3A13F-17D8-07D4-67CB-5C15C0A9C5A5}"/>
+                </a:ext>
+              </a:extLst>
+            </p:cNvPr>
+            <p:cNvSpPr txBox="1"/>
+            <p:nvPr/>
+          </p:nvSpPr>
+          <p:spPr>
+            <a:xfrm>
+              <a:off x="1167760" y="24587932"/>
+              <a:ext cx="14552848" cy="1107996"/>
+            </a:xfrm>
+            <a:prstGeom prst="rect">
+              <a:avLst/>
+            </a:prstGeom>
             <a:solidFill>
-              <a:schemeClr val="tx1"/>
+              <a:schemeClr val="bg1"/>
             </a:solidFill>
-          </a:ln>
-        </p:spPr>
-      </p:pic>
-      <p:sp>
-        <p:nvSpPr>
-          <p:cNvPr id="31" name="TextBox 30">
+            <a:ln>
+              <a:solidFill>
+                <a:schemeClr val="tx1"/>
+              </a:solidFill>
+            </a:ln>
+          </p:spPr>
+          <p:txBody>
+            <a:bodyPr wrap="square">
+              <a:spAutoFit/>
+            </a:bodyPr>
+            <a:lstStyle/>
+            <a:p>
+              <a:pPr algn="ctr"/>
+              <a:r>
+                <a:rPr lang="en-GB" sz="6600" dirty="0"/>
+                <a:t>STEP 2: PHYLOGENETIC REORDERING</a:t>
+              </a:r>
+            </a:p>
+          </p:txBody>
+        </p:sp>
+        <p:sp>
+          <p:nvSpPr>
+            <p:cNvPr id="32" name="TextBox 31">
+              <a:extLst>
+                <a:ext uri="{FF2B5EF4-FFF2-40B4-BE49-F238E27FC236}">
+                  <a16:creationId xmlns:a16="http://schemas.microsoft.com/office/drawing/2014/main" id="{2221FE62-342C-7C40-66DA-97E08F4157B3}"/>
+                </a:ext>
+              </a:extLst>
+            </p:cNvPr>
+            <p:cNvSpPr txBox="1"/>
+            <p:nvPr/>
+          </p:nvSpPr>
+          <p:spPr>
+            <a:xfrm>
+              <a:off x="1641620" y="37259335"/>
+              <a:ext cx="13605129" cy="2123658"/>
+            </a:xfrm>
+            <a:prstGeom prst="rect">
+              <a:avLst/>
+            </a:prstGeom>
+            <a:solidFill>
+              <a:schemeClr val="bg1"/>
+            </a:solidFill>
+            <a:ln>
+              <a:solidFill>
+                <a:schemeClr val="tx1"/>
+              </a:solidFill>
+            </a:ln>
+          </p:spPr>
+          <p:txBody>
+            <a:bodyPr wrap="square">
+              <a:spAutoFit/>
+            </a:bodyPr>
+            <a:lstStyle/>
+            <a:p>
+              <a:pPr algn="ctr"/>
+              <a:r>
+                <a:rPr lang="en-GB" sz="6600" dirty="0"/>
+                <a:t>Reordering of genomes in each batch using an estimated evolutionary tree</a:t>
+              </a:r>
+            </a:p>
+          </p:txBody>
+        </p:sp>
+      </p:grpSp>
+      <p:grpSp>
+        <p:nvGrpSpPr>
+          <p:cNvPr id="36" name="Group 35">
             <a:extLst>
               <a:ext uri="{FF2B5EF4-FFF2-40B4-BE49-F238E27FC236}">
-                <a16:creationId xmlns:a16="http://schemas.microsoft.com/office/drawing/2014/main" id="{ABE3A13F-17D8-07D4-67CB-5C15C0A9C5A5}"/>
+                <a16:creationId xmlns:a16="http://schemas.microsoft.com/office/drawing/2014/main" id="{EF6218AB-8496-E61F-C22C-C606AD846E53}"/>
               </a:ext>
             </a:extLst>
           </p:cNvPr>
-          <p:cNvSpPr txBox="1"/>
+          <p:cNvGrpSpPr/>
           <p:nvPr/>
-        </p:nvSpPr>
-        <p:spPr>
+        </p:nvGrpSpPr>
+        <p:grpSpPr>
           <a:xfrm>
-            <a:off x="1167760" y="24587932"/>
-            <a:ext cx="14552848" cy="1107996"/>
+            <a:off x="18559117" y="23276477"/>
+            <a:ext cx="9477875" cy="15730750"/>
+            <a:chOff x="18559117" y="23532274"/>
+            <a:chExt cx="9477875" cy="15730750"/>
           </a:xfrm>
-          <a:prstGeom prst="rect">
-            <a:avLst/>
-          </a:prstGeom>
-          <a:solidFill>
-            <a:schemeClr val="bg1"/>
-          </a:solidFill>
-          <a:ln>
+        </p:grpSpPr>
+        <p:pic>
+          <p:nvPicPr>
+            <p:cNvPr id="33" name="Picture 32">
+              <a:extLst>
+                <a:ext uri="{FF2B5EF4-FFF2-40B4-BE49-F238E27FC236}">
+                  <a16:creationId xmlns:a16="http://schemas.microsoft.com/office/drawing/2014/main" id="{5295A63E-8549-9944-B5C0-E958B28CCEEF}"/>
+                </a:ext>
+              </a:extLst>
+            </p:cNvPr>
+            <p:cNvPicPr>
+              <a:picLocks noChangeAspect="1"/>
+            </p:cNvPicPr>
+            <p:nvPr/>
+          </p:nvPicPr>
+          <p:blipFill>
+            <a:blip r:embed="rId4"/>
+            <a:stretch>
+              <a:fillRect/>
+            </a:stretch>
+          </p:blipFill>
+          <p:spPr>
+            <a:xfrm>
+              <a:off x="18873590" y="25010172"/>
+              <a:ext cx="9089415" cy="10774279"/>
+            </a:xfrm>
+            <a:prstGeom prst="rect">
+              <a:avLst/>
+            </a:prstGeom>
+            <a:ln>
+              <a:solidFill>
+                <a:schemeClr val="tx1"/>
+              </a:solidFill>
+            </a:ln>
+          </p:spPr>
+        </p:pic>
+        <p:sp>
+          <p:nvSpPr>
+            <p:cNvPr id="34" name="TextBox 33">
+              <a:extLst>
+                <a:ext uri="{FF2B5EF4-FFF2-40B4-BE49-F238E27FC236}">
+                  <a16:creationId xmlns:a16="http://schemas.microsoft.com/office/drawing/2014/main" id="{B4AD2AAC-3EA8-65D5-7ED8-5D7802D72D40}"/>
+                </a:ext>
+              </a:extLst>
+            </p:cNvPr>
+            <p:cNvSpPr txBox="1"/>
+            <p:nvPr/>
+          </p:nvSpPr>
+          <p:spPr>
+            <a:xfrm>
+              <a:off x="18873565" y="36123703"/>
+              <a:ext cx="9089414" cy="3139321"/>
+            </a:xfrm>
+            <a:prstGeom prst="rect">
+              <a:avLst/>
+            </a:prstGeom>
+            <a:ln/>
+          </p:spPr>
+          <p:style>
+            <a:lnRef idx="2">
+              <a:schemeClr val="dk1"/>
+            </a:lnRef>
+            <a:fillRef idx="1">
+              <a:schemeClr val="lt1"/>
+            </a:fillRef>
+            <a:effectRef idx="0">
+              <a:schemeClr val="dk1"/>
+            </a:effectRef>
+            <a:fontRef idx="minor">
+              <a:schemeClr val="dk1"/>
+            </a:fontRef>
+          </p:style>
+          <p:txBody>
+            <a:bodyPr wrap="square">
+              <a:spAutoFit/>
+            </a:bodyPr>
+            <a:lstStyle/>
+            <a:p>
+              <a:pPr algn="ctr">
+                <a:spcBef>
+                  <a:spcPts val="1200"/>
+                </a:spcBef>
+                <a:spcAft>
+                  <a:spcPts val="1200"/>
+                </a:spcAft>
+              </a:pPr>
+              <a:r>
+                <a:rPr lang="en-GB" sz="6600" dirty="0">
+                  <a:solidFill>
+                    <a:srgbClr val="000000"/>
+                  </a:solidFill>
+                  <a:latin typeface="Arial" panose="020B0604020202020204" pitchFamily="34" charset="0"/>
+                </a:rPr>
+                <a:t>Lossless compression of 1-3 orders of magnitude</a:t>
+              </a:r>
+            </a:p>
+          </p:txBody>
+        </p:sp>
+        <p:sp>
+          <p:nvSpPr>
+            <p:cNvPr id="35" name="TextBox 34">
+              <a:extLst>
+                <a:ext uri="{FF2B5EF4-FFF2-40B4-BE49-F238E27FC236}">
+                  <a16:creationId xmlns:a16="http://schemas.microsoft.com/office/drawing/2014/main" id="{1DD3D55A-BDDB-7DA5-DB0F-1CC5DA8CF58F}"/>
+                </a:ext>
+              </a:extLst>
+            </p:cNvPr>
+            <p:cNvSpPr txBox="1"/>
+            <p:nvPr/>
+          </p:nvSpPr>
+          <p:spPr>
+            <a:xfrm>
+              <a:off x="18559117" y="23532274"/>
+              <a:ext cx="9477875" cy="1107996"/>
+            </a:xfrm>
+            <a:prstGeom prst="rect">
+              <a:avLst/>
+            </a:prstGeom>
             <a:solidFill>
-              <a:schemeClr val="tx1"/>
+              <a:schemeClr val="bg1"/>
             </a:solidFill>
-          </a:ln>
-        </p:spPr>
-        <p:txBody>
-          <a:bodyPr wrap="square">
-            <a:spAutoFit/>
-          </a:bodyPr>
-          <a:lstStyle/>
-          <a:p>
-            <a:pPr algn="ctr"/>
-            <a:r>
-              <a:rPr lang="en-GB" sz="6600" dirty="0"/>
-              <a:t>STEP 2: PHYLOGENETIC REORDERING</a:t>
-            </a:r>
-          </a:p>
-        </p:txBody>
-      </p:sp>
-      <p:sp>
-        <p:nvSpPr>
-          <p:cNvPr id="32" name="TextBox 31">
-            <a:extLst>
-              <a:ext uri="{FF2B5EF4-FFF2-40B4-BE49-F238E27FC236}">
-                <a16:creationId xmlns:a16="http://schemas.microsoft.com/office/drawing/2014/main" id="{2221FE62-342C-7C40-66DA-97E08F4157B3}"/>
-              </a:ext>
-            </a:extLst>
-          </p:cNvPr>
-          <p:cNvSpPr txBox="1"/>
-          <p:nvPr/>
-        </p:nvSpPr>
-        <p:spPr>
-          <a:xfrm>
-            <a:off x="1641620" y="37259335"/>
-            <a:ext cx="13605129" cy="2123658"/>
-          </a:xfrm>
-          <a:prstGeom prst="rect">
-            <a:avLst/>
-          </a:prstGeom>
-          <a:solidFill>
-            <a:schemeClr val="bg1"/>
-          </a:solidFill>
-          <a:ln>
-            <a:solidFill>
-              <a:schemeClr val="tx1"/>
-            </a:solidFill>
-          </a:ln>
-        </p:spPr>
-        <p:txBody>
-          <a:bodyPr wrap="square">
-            <a:spAutoFit/>
-          </a:bodyPr>
-          <a:lstStyle/>
-          <a:p>
-            <a:pPr algn="ctr"/>
-            <a:r>
-              <a:rPr lang="en-GB" sz="6600" dirty="0"/>
-              <a:t>Reordering of genomes in each batch using an estimated evolutionary tree</a:t>
-            </a:r>
-          </a:p>
-        </p:txBody>
-      </p:sp>
-      <p:pic>
-        <p:nvPicPr>
-          <p:cNvPr id="33" name="Picture 32">
-            <a:extLst>
-              <a:ext uri="{FF2B5EF4-FFF2-40B4-BE49-F238E27FC236}">
-                <a16:creationId xmlns:a16="http://schemas.microsoft.com/office/drawing/2014/main" id="{5295A63E-8549-9944-B5C0-E958B28CCEEF}"/>
-              </a:ext>
-            </a:extLst>
-          </p:cNvPr>
-          <p:cNvPicPr>
-            <a:picLocks noChangeAspect="1"/>
-          </p:cNvPicPr>
-          <p:nvPr/>
-        </p:nvPicPr>
-        <p:blipFill>
-          <a:blip r:embed="rId4"/>
-          <a:stretch>
-            <a:fillRect/>
-          </a:stretch>
-        </p:blipFill>
-        <p:spPr>
-          <a:xfrm>
-            <a:off x="18873590" y="25043005"/>
-            <a:ext cx="9089415" cy="10774279"/>
-          </a:xfrm>
-          <a:prstGeom prst="rect">
-            <a:avLst/>
-          </a:prstGeom>
-          <a:ln>
-            <a:solidFill>
-              <a:schemeClr val="tx1"/>
-            </a:solidFill>
-          </a:ln>
-        </p:spPr>
-      </p:pic>
-      <p:sp>
-        <p:nvSpPr>
-          <p:cNvPr id="34" name="TextBox 33">
-            <a:extLst>
-              <a:ext uri="{FF2B5EF4-FFF2-40B4-BE49-F238E27FC236}">
-                <a16:creationId xmlns:a16="http://schemas.microsoft.com/office/drawing/2014/main" id="{B4AD2AAC-3EA8-65D5-7ED8-5D7802D72D40}"/>
-              </a:ext>
-            </a:extLst>
-          </p:cNvPr>
-          <p:cNvSpPr txBox="1"/>
-          <p:nvPr/>
-        </p:nvSpPr>
-        <p:spPr>
-          <a:xfrm>
-            <a:off x="18873590" y="36696033"/>
-            <a:ext cx="9089414" cy="3139321"/>
-          </a:xfrm>
-          <a:prstGeom prst="rect">
-            <a:avLst/>
-          </a:prstGeom>
-          <a:ln/>
-        </p:spPr>
-        <p:style>
-          <a:lnRef idx="2">
-            <a:schemeClr val="dk1"/>
-          </a:lnRef>
-          <a:fillRef idx="1">
-            <a:schemeClr val="lt1"/>
-          </a:fillRef>
-          <a:effectRef idx="0">
-            <a:schemeClr val="dk1"/>
-          </a:effectRef>
-          <a:fontRef idx="minor">
-            <a:schemeClr val="dk1"/>
-          </a:fontRef>
-        </p:style>
-        <p:txBody>
-          <a:bodyPr wrap="square">
-            <a:spAutoFit/>
-          </a:bodyPr>
-          <a:lstStyle/>
-          <a:p>
-            <a:pPr algn="ctr">
-              <a:spcBef>
-                <a:spcPts val="1200"/>
-              </a:spcBef>
-              <a:spcAft>
-                <a:spcPts val="1200"/>
-              </a:spcAft>
-            </a:pPr>
-            <a:r>
-              <a:rPr lang="en-GB" sz="6600" dirty="0">
-                <a:solidFill>
-                  <a:srgbClr val="000000"/>
-                </a:solidFill>
-                <a:latin typeface="Arial" panose="020B0604020202020204" pitchFamily="34" charset="0"/>
-              </a:rPr>
-              <a:t>Lossless compression of 1-3 orders of magnitude</a:t>
-            </a:r>
-          </a:p>
-        </p:txBody>
-      </p:sp>
-      <p:sp>
-        <p:nvSpPr>
-          <p:cNvPr id="35" name="TextBox 34">
-            <a:extLst>
-              <a:ext uri="{FF2B5EF4-FFF2-40B4-BE49-F238E27FC236}">
-                <a16:creationId xmlns:a16="http://schemas.microsoft.com/office/drawing/2014/main" id="{1DD3D55A-BDDB-7DA5-DB0F-1CC5DA8CF58F}"/>
-              </a:ext>
-            </a:extLst>
-          </p:cNvPr>
-          <p:cNvSpPr txBox="1"/>
-          <p:nvPr/>
-        </p:nvSpPr>
-        <p:spPr>
-          <a:xfrm>
-            <a:off x="18548369" y="22990594"/>
-            <a:ext cx="9477875" cy="1107996"/>
-          </a:xfrm>
-          <a:prstGeom prst="rect">
-            <a:avLst/>
-          </a:prstGeom>
-          <a:solidFill>
-            <a:schemeClr val="bg1"/>
-          </a:solidFill>
-          <a:ln>
-            <a:solidFill>
-              <a:schemeClr val="tx1"/>
-            </a:solidFill>
-          </a:ln>
-        </p:spPr>
-        <p:txBody>
-          <a:bodyPr wrap="square">
-            <a:spAutoFit/>
-          </a:bodyPr>
-          <a:lstStyle/>
-          <a:p>
-            <a:pPr algn="ctr"/>
-            <a:r>
-              <a:rPr lang="en-GB" sz="6600" dirty="0"/>
-              <a:t>RESULTING COMPRESSION</a:t>
-            </a:r>
-          </a:p>
-        </p:txBody>
-      </p:sp>
+            <a:ln>
+              <a:solidFill>
+                <a:schemeClr val="tx1"/>
+              </a:solidFill>
+            </a:ln>
+          </p:spPr>
+          <p:txBody>
+            <a:bodyPr wrap="square">
+              <a:spAutoFit/>
+            </a:bodyPr>
+            <a:lstStyle/>
+            <a:p>
+              <a:pPr algn="ctr"/>
+              <a:r>
+                <a:rPr lang="en-GB" sz="6600" dirty="0"/>
+                <a:t>RESULTING COMPRESSION</a:t>
+              </a:r>
+            </a:p>
+          </p:txBody>
+        </p:sp>
+      </p:grpSp>
     </p:spTree>
     <p:extLst>
       <p:ext uri="{BB962C8B-B14F-4D97-AF65-F5344CB8AC3E}">
@@ -12571,310 +12639,289 @@
           </p:style>
         </p:cxnSp>
       </p:grpSp>
-      <p:grpSp>
-        <p:nvGrpSpPr>
-          <p:cNvPr id="14" name="Group 13">
+      <p:sp>
+        <p:nvSpPr>
+          <p:cNvPr id="8" name="TextBox 7">
             <a:extLst>
               <a:ext uri="{FF2B5EF4-FFF2-40B4-BE49-F238E27FC236}">
-                <a16:creationId xmlns:a16="http://schemas.microsoft.com/office/drawing/2014/main" id="{F56D094C-DF9C-B289-4D30-6DB8E3B99B66}"/>
+                <a16:creationId xmlns:a16="http://schemas.microsoft.com/office/drawing/2014/main" id="{7C40B611-03AB-26BD-5CE4-0E4541D22EAB}"/>
               </a:ext>
             </a:extLst>
           </p:cNvPr>
-          <p:cNvGrpSpPr/>
+          <p:cNvSpPr txBox="1"/>
           <p:nvPr/>
-        </p:nvGrpSpPr>
-        <p:grpSpPr>
+        </p:nvSpPr>
+        <p:spPr>
           <a:xfrm>
-            <a:off x="4578555" y="26890761"/>
-            <a:ext cx="21118099" cy="12744457"/>
-            <a:chOff x="4578557" y="26885005"/>
-            <a:chExt cx="21118099" cy="12744457"/>
+            <a:off x="15577513" y="36610709"/>
+            <a:ext cx="10616177" cy="1200329"/>
           </a:xfrm>
-        </p:grpSpPr>
-        <p:sp>
-          <p:nvSpPr>
-            <p:cNvPr id="8" name="TextBox 7">
-              <a:extLst>
-                <a:ext uri="{FF2B5EF4-FFF2-40B4-BE49-F238E27FC236}">
-                  <a16:creationId xmlns:a16="http://schemas.microsoft.com/office/drawing/2014/main" id="{7C40B611-03AB-26BD-5CE4-0E4541D22EAB}"/>
-                </a:ext>
-              </a:extLst>
-            </p:cNvPr>
-            <p:cNvSpPr txBox="1"/>
-            <p:nvPr/>
-          </p:nvSpPr>
-          <p:spPr>
-            <a:xfrm>
-              <a:off x="16131843" y="37074917"/>
-              <a:ext cx="9564812" cy="2554545"/>
-            </a:xfrm>
-            <a:prstGeom prst="rect">
-              <a:avLst/>
-            </a:prstGeom>
+          <a:prstGeom prst="rect">
+            <a:avLst/>
+          </a:prstGeom>
+          <a:solidFill>
+            <a:srgbClr val="FF0000">
+              <a:alpha val="60000"/>
+            </a:srgbClr>
+          </a:solidFill>
+          <a:ln>
             <a:solidFill>
-              <a:srgbClr val="FF0000">
-                <a:alpha val="60000"/>
-              </a:srgbClr>
+              <a:schemeClr val="accent1"/>
             </a:solidFill>
-            <a:ln>
-              <a:solidFill>
-                <a:schemeClr val="accent1"/>
-              </a:solidFill>
-            </a:ln>
-          </p:spPr>
-          <p:txBody>
-            <a:bodyPr wrap="square">
-              <a:spAutoFit/>
-            </a:bodyPr>
-            <a:lstStyle/>
-            <a:p>
-              <a:pPr algn="ctr"/>
-              <a:r>
-                <a:rPr lang="en-GB" sz="8000" dirty="0"/>
-                <a:t>Inefficient Data Transmission</a:t>
-              </a:r>
-            </a:p>
-          </p:txBody>
-        </p:sp>
-        <p:sp>
-          <p:nvSpPr>
-            <p:cNvPr id="9" name="TextBox 8">
-              <a:extLst>
-                <a:ext uri="{FF2B5EF4-FFF2-40B4-BE49-F238E27FC236}">
-                  <a16:creationId xmlns:a16="http://schemas.microsoft.com/office/drawing/2014/main" id="{E8215D52-D88B-2118-4A9C-C635E91C384A}"/>
-                </a:ext>
-              </a:extLst>
-            </p:cNvPr>
-            <p:cNvSpPr txBox="1"/>
-            <p:nvPr/>
-          </p:nvSpPr>
-          <p:spPr>
-            <a:xfrm>
-              <a:off x="16131844" y="31979961"/>
-              <a:ext cx="9564812" cy="2554545"/>
-            </a:xfrm>
-            <a:prstGeom prst="rect">
-              <a:avLst/>
-            </a:prstGeom>
+          </a:ln>
+        </p:spPr>
+        <p:txBody>
+          <a:bodyPr wrap="square">
+            <a:noAutofit/>
+          </a:bodyPr>
+          <a:lstStyle/>
+          <a:p>
+            <a:pPr algn="ctr"/>
+            <a:r>
+              <a:rPr lang="en-GB" sz="7200" dirty="0"/>
+              <a:t>Inefficient Transmission</a:t>
+            </a:r>
+          </a:p>
+        </p:txBody>
+      </p:sp>
+      <p:sp>
+        <p:nvSpPr>
+          <p:cNvPr id="9" name="TextBox 8">
+            <a:extLst>
+              <a:ext uri="{FF2B5EF4-FFF2-40B4-BE49-F238E27FC236}">
+                <a16:creationId xmlns:a16="http://schemas.microsoft.com/office/drawing/2014/main" id="{E8215D52-D88B-2118-4A9C-C635E91C384A}"/>
+              </a:ext>
+            </a:extLst>
+          </p:cNvPr>
+          <p:cNvSpPr txBox="1"/>
+          <p:nvPr/>
+        </p:nvSpPr>
+        <p:spPr>
+          <a:xfrm>
+            <a:off x="15577513" y="32079057"/>
+            <a:ext cx="10616177" cy="1200329"/>
+          </a:xfrm>
+          <a:prstGeom prst="rect">
+            <a:avLst/>
+          </a:prstGeom>
+          <a:solidFill>
+            <a:srgbClr val="FF0000">
+              <a:alpha val="60000"/>
+            </a:srgbClr>
+          </a:solidFill>
+          <a:ln>
             <a:solidFill>
-              <a:srgbClr val="FF0000">
-                <a:alpha val="60000"/>
-              </a:srgbClr>
+              <a:schemeClr val="accent1"/>
             </a:solidFill>
-            <a:ln>
-              <a:solidFill>
-                <a:schemeClr val="accent1"/>
-              </a:solidFill>
-            </a:ln>
-          </p:spPr>
-          <p:txBody>
-            <a:bodyPr wrap="square">
-              <a:spAutoFit/>
-            </a:bodyPr>
-            <a:lstStyle/>
-            <a:p>
-              <a:pPr algn="ctr"/>
-              <a:r>
-                <a:rPr lang="en-GB" sz="8000" dirty="0"/>
-                <a:t>Inconsistent Query Times</a:t>
-              </a:r>
-              <a:endParaRPr lang="en-FR" sz="8000" dirty="0"/>
-            </a:p>
-          </p:txBody>
-        </p:sp>
-        <p:sp>
-          <p:nvSpPr>
-            <p:cNvPr id="10" name="TextBox 9">
-              <a:extLst>
-                <a:ext uri="{FF2B5EF4-FFF2-40B4-BE49-F238E27FC236}">
-                  <a16:creationId xmlns:a16="http://schemas.microsoft.com/office/drawing/2014/main" id="{E79410A8-155D-E92C-1008-A21D21937117}"/>
-                </a:ext>
-              </a:extLst>
-            </p:cNvPr>
-            <p:cNvSpPr txBox="1"/>
-            <p:nvPr/>
-          </p:nvSpPr>
-          <p:spPr>
-            <a:xfrm>
-              <a:off x="4578557" y="32472403"/>
-              <a:ext cx="9564812" cy="1569660"/>
-            </a:xfrm>
-            <a:prstGeom prst="rect">
-              <a:avLst/>
-            </a:prstGeom>
+          </a:ln>
+        </p:spPr>
+        <p:txBody>
+          <a:bodyPr wrap="square">
+            <a:noAutofit/>
+          </a:bodyPr>
+          <a:lstStyle/>
+          <a:p>
+            <a:pPr algn="ctr"/>
+            <a:r>
+              <a:rPr lang="en-GB" sz="7200" dirty="0"/>
+              <a:t>Inconsistent Query Times</a:t>
+            </a:r>
+            <a:endParaRPr lang="en-FR" sz="7200" dirty="0"/>
+          </a:p>
+        </p:txBody>
+      </p:sp>
+      <p:sp>
+        <p:nvSpPr>
+          <p:cNvPr id="10" name="TextBox 9">
+            <a:extLst>
+              <a:ext uri="{FF2B5EF4-FFF2-40B4-BE49-F238E27FC236}">
+                <a16:creationId xmlns:a16="http://schemas.microsoft.com/office/drawing/2014/main" id="{E79410A8-155D-E92C-1008-A21D21937117}"/>
+              </a:ext>
+            </a:extLst>
+          </p:cNvPr>
+          <p:cNvSpPr txBox="1"/>
+          <p:nvPr/>
+        </p:nvSpPr>
+        <p:spPr>
+          <a:xfrm>
+            <a:off x="3702255" y="32032385"/>
+            <a:ext cx="9564813" cy="1293667"/>
+          </a:xfrm>
+          <a:prstGeom prst="rect">
+            <a:avLst/>
+          </a:prstGeom>
+          <a:solidFill>
+            <a:srgbClr val="FF0000">
+              <a:alpha val="60000"/>
+            </a:srgbClr>
+          </a:solidFill>
+          <a:ln>
             <a:solidFill>
-              <a:srgbClr val="FF0000">
-                <a:alpha val="60000"/>
-              </a:srgbClr>
+              <a:schemeClr val="accent1"/>
             </a:solidFill>
-            <a:ln>
-              <a:solidFill>
-                <a:schemeClr val="accent1"/>
-              </a:solidFill>
-            </a:ln>
-          </p:spPr>
-          <p:txBody>
-            <a:bodyPr wrap="square">
-              <a:spAutoFit/>
-            </a:bodyPr>
-            <a:lstStyle/>
-            <a:p>
-              <a:pPr algn="ctr"/>
-              <a:r>
-                <a:rPr lang="en-GB" sz="9600" dirty="0">
-                  <a:ln>
-                    <a:solidFill>
-                      <a:schemeClr val="bg1"/>
-                    </a:solidFill>
-                  </a:ln>
+          </a:ln>
+        </p:spPr>
+        <p:txBody>
+          <a:bodyPr wrap="square">
+            <a:noAutofit/>
+          </a:bodyPr>
+          <a:lstStyle/>
+          <a:p>
+            <a:pPr algn="ctr"/>
+            <a:r>
+              <a:rPr lang="en-GB" sz="8000" dirty="0">
+                <a:ln>
                   <a:solidFill>
                     <a:schemeClr val="bg1"/>
                   </a:solidFill>
-                </a:rPr>
-                <a:t>CONSEQUENCES</a:t>
-              </a:r>
-            </a:p>
-          </p:txBody>
-        </p:sp>
-        <p:sp>
-          <p:nvSpPr>
-            <p:cNvPr id="11" name="TextBox 10">
-              <a:extLst>
-                <a:ext uri="{FF2B5EF4-FFF2-40B4-BE49-F238E27FC236}">
-                  <a16:creationId xmlns:a16="http://schemas.microsoft.com/office/drawing/2014/main" id="{D3A851C4-1A88-E212-48CB-43E565B07776}"/>
-                </a:ext>
-              </a:extLst>
-            </p:cNvPr>
-            <p:cNvSpPr txBox="1"/>
-            <p:nvPr/>
-          </p:nvSpPr>
-          <p:spPr>
-            <a:xfrm>
-              <a:off x="16131844" y="30048036"/>
-              <a:ext cx="9564812" cy="1323439"/>
-            </a:xfrm>
-            <a:prstGeom prst="rect">
-              <a:avLst/>
-            </a:prstGeom>
+                </a:ln>
+                <a:solidFill>
+                  <a:schemeClr val="bg1"/>
+                </a:solidFill>
+              </a:rPr>
+              <a:t>CONSEQUENCES</a:t>
+            </a:r>
+          </a:p>
+        </p:txBody>
+      </p:sp>
+      <p:sp>
+        <p:nvSpPr>
+          <p:cNvPr id="11" name="TextBox 10">
+            <a:extLst>
+              <a:ext uri="{FF2B5EF4-FFF2-40B4-BE49-F238E27FC236}">
+                <a16:creationId xmlns:a16="http://schemas.microsoft.com/office/drawing/2014/main" id="{D3A851C4-1A88-E212-48CB-43E565B07776}"/>
+              </a:ext>
+            </a:extLst>
+          </p:cNvPr>
+          <p:cNvSpPr txBox="1"/>
+          <p:nvPr/>
+        </p:nvSpPr>
+        <p:spPr>
+          <a:xfrm>
+            <a:off x="15577513" y="29813230"/>
+            <a:ext cx="10616177" cy="1200329"/>
+          </a:xfrm>
+          <a:prstGeom prst="rect">
+            <a:avLst/>
+          </a:prstGeom>
+          <a:solidFill>
+            <a:srgbClr val="FF0000">
+              <a:alpha val="60000"/>
+            </a:srgbClr>
+          </a:solidFill>
+          <a:ln>
             <a:solidFill>
-              <a:srgbClr val="FF0000">
-                <a:alpha val="60000"/>
-              </a:srgbClr>
+              <a:schemeClr val="accent1"/>
             </a:solidFill>
-            <a:ln>
-              <a:solidFill>
-                <a:schemeClr val="accent1"/>
-              </a:solidFill>
-            </a:ln>
-          </p:spPr>
-          <p:txBody>
-            <a:bodyPr wrap="square">
-              <a:spAutoFit/>
-            </a:bodyPr>
-            <a:lstStyle/>
-            <a:p>
-              <a:pPr algn="ctr"/>
-              <a:r>
-                <a:rPr lang="en-GB" sz="8000" dirty="0"/>
-                <a:t>Hinder Parallelization</a:t>
-              </a:r>
-              <a:endParaRPr lang="en-FR" sz="8000" dirty="0"/>
-            </a:p>
-          </p:txBody>
-        </p:sp>
-        <p:sp>
-          <p:nvSpPr>
-            <p:cNvPr id="12" name="TextBox 11">
-              <a:extLst>
-                <a:ext uri="{FF2B5EF4-FFF2-40B4-BE49-F238E27FC236}">
-                  <a16:creationId xmlns:a16="http://schemas.microsoft.com/office/drawing/2014/main" id="{7E585462-91ED-4044-452E-67E16A43CFC8}"/>
-                </a:ext>
-              </a:extLst>
-            </p:cNvPr>
-            <p:cNvSpPr txBox="1"/>
-            <p:nvPr/>
-          </p:nvSpPr>
-          <p:spPr>
-            <a:xfrm>
-              <a:off x="16131844" y="35142992"/>
-              <a:ext cx="9564812" cy="1323439"/>
-            </a:xfrm>
-            <a:prstGeom prst="rect">
-              <a:avLst/>
-            </a:prstGeom>
+          </a:ln>
+        </p:spPr>
+        <p:txBody>
+          <a:bodyPr wrap="square">
+            <a:noAutofit/>
+          </a:bodyPr>
+          <a:lstStyle/>
+          <a:p>
+            <a:pPr algn="ctr"/>
+            <a:r>
+              <a:rPr lang="en-GB" sz="7200" dirty="0"/>
+              <a:t>Hinder Parallelization</a:t>
+            </a:r>
+            <a:endParaRPr lang="en-FR" sz="7200" dirty="0"/>
+          </a:p>
+        </p:txBody>
+      </p:sp>
+      <p:sp>
+        <p:nvSpPr>
+          <p:cNvPr id="12" name="TextBox 11">
+            <a:extLst>
+              <a:ext uri="{FF2B5EF4-FFF2-40B4-BE49-F238E27FC236}">
+                <a16:creationId xmlns:a16="http://schemas.microsoft.com/office/drawing/2014/main" id="{7E585462-91ED-4044-452E-67E16A43CFC8}"/>
+              </a:ext>
+            </a:extLst>
+          </p:cNvPr>
+          <p:cNvSpPr txBox="1"/>
+          <p:nvPr/>
+        </p:nvSpPr>
+        <p:spPr>
+          <a:xfrm>
+            <a:off x="15577513" y="34344884"/>
+            <a:ext cx="10616177" cy="1200329"/>
+          </a:xfrm>
+          <a:prstGeom prst="rect">
+            <a:avLst/>
+          </a:prstGeom>
+          <a:solidFill>
+            <a:srgbClr val="FF0000">
+              <a:alpha val="60000"/>
+            </a:srgbClr>
+          </a:solidFill>
+          <a:ln>
             <a:solidFill>
-              <a:srgbClr val="FF0000">
-                <a:alpha val="60000"/>
-              </a:srgbClr>
+              <a:schemeClr val="accent1"/>
             </a:solidFill>
-            <a:ln>
-              <a:solidFill>
-                <a:schemeClr val="accent1"/>
-              </a:solidFill>
-            </a:ln>
-          </p:spPr>
-          <p:txBody>
-            <a:bodyPr wrap="square">
-              <a:spAutoFit/>
-            </a:bodyPr>
-            <a:lstStyle/>
-            <a:p>
-              <a:pPr algn="ctr"/>
-              <a:r>
-                <a:rPr lang="en-GB" sz="8000" dirty="0"/>
-                <a:t>Memory Overuse </a:t>
-              </a:r>
-              <a:endParaRPr lang="en-FR" sz="8000" dirty="0"/>
-            </a:p>
-          </p:txBody>
-        </p:sp>
-        <p:sp>
-          <p:nvSpPr>
-            <p:cNvPr id="13" name="TextBox 12">
-              <a:extLst>
-                <a:ext uri="{FF2B5EF4-FFF2-40B4-BE49-F238E27FC236}">
-                  <a16:creationId xmlns:a16="http://schemas.microsoft.com/office/drawing/2014/main" id="{CCF0A879-0C2A-6DBE-C3F1-88B76FA7CACA}"/>
-                </a:ext>
-              </a:extLst>
-            </p:cNvPr>
-            <p:cNvSpPr txBox="1"/>
-            <p:nvPr/>
-          </p:nvSpPr>
-          <p:spPr>
-            <a:xfrm>
-              <a:off x="16045984" y="26885005"/>
-              <a:ext cx="9564813" cy="2554545"/>
-            </a:xfrm>
-            <a:prstGeom prst="rect">
-              <a:avLst/>
-            </a:prstGeom>
+          </a:ln>
+        </p:spPr>
+        <p:txBody>
+          <a:bodyPr wrap="square">
+            <a:noAutofit/>
+          </a:bodyPr>
+          <a:lstStyle/>
+          <a:p>
+            <a:pPr algn="ctr"/>
+            <a:r>
+              <a:rPr lang="en-GB" sz="7200" dirty="0"/>
+              <a:t>Memory Overuse </a:t>
+            </a:r>
+            <a:endParaRPr lang="en-FR" sz="7200" dirty="0"/>
+          </a:p>
+        </p:txBody>
+      </p:sp>
+      <p:sp>
+        <p:nvSpPr>
+          <p:cNvPr id="13" name="TextBox 12">
+            <a:extLst>
+              <a:ext uri="{FF2B5EF4-FFF2-40B4-BE49-F238E27FC236}">
+                <a16:creationId xmlns:a16="http://schemas.microsoft.com/office/drawing/2014/main" id="{CCF0A879-0C2A-6DBE-C3F1-88B76FA7CACA}"/>
+              </a:ext>
+            </a:extLst>
+          </p:cNvPr>
+          <p:cNvSpPr txBox="1"/>
+          <p:nvPr/>
+        </p:nvSpPr>
+        <p:spPr>
+          <a:xfrm>
+            <a:off x="15577513" y="27547403"/>
+            <a:ext cx="10616177" cy="1200329"/>
+          </a:xfrm>
+          <a:prstGeom prst="rect">
+            <a:avLst/>
+          </a:prstGeom>
+          <a:solidFill>
+            <a:srgbClr val="FF0000">
+              <a:alpha val="60000"/>
+            </a:srgbClr>
+          </a:solidFill>
+          <a:ln>
             <a:solidFill>
-              <a:srgbClr val="FF0000">
-                <a:alpha val="60000"/>
-              </a:srgbClr>
+              <a:schemeClr val="accent1"/>
             </a:solidFill>
-            <a:ln>
-              <a:solidFill>
-                <a:schemeClr val="accent1"/>
-              </a:solidFill>
-            </a:ln>
-          </p:spPr>
-          <p:txBody>
-            <a:bodyPr wrap="square">
-              <a:spAutoFit/>
-            </a:bodyPr>
-            <a:lstStyle/>
-            <a:p>
-              <a:pPr algn="ctr"/>
-              <a:r>
-                <a:rPr lang="en-GB" sz="8000" dirty="0"/>
-                <a:t>Unbalanced Workloads</a:t>
-              </a:r>
-              <a:endParaRPr lang="en-FR" sz="8000" dirty="0"/>
-            </a:p>
-          </p:txBody>
-        </p:sp>
-      </p:grpSp>
+          </a:ln>
+        </p:spPr>
+        <p:txBody>
+          <a:bodyPr wrap="square">
+            <a:spAutoFit/>
+          </a:bodyPr>
+          <a:lstStyle/>
+          <a:p>
+            <a:pPr algn="ctr"/>
+            <a:r>
+              <a:rPr lang="en-GB" sz="7200" dirty="0"/>
+              <a:t>Unbalanced Workloads</a:t>
+            </a:r>
+            <a:endParaRPr lang="en-FR" sz="7200" dirty="0"/>
+          </a:p>
+        </p:txBody>
+      </p:sp>
     </p:spTree>
     <p:extLst>
       <p:ext uri="{BB962C8B-B14F-4D97-AF65-F5344CB8AC3E}">
@@ -12934,8 +12981,8 @@
           </a:p>
         </p:txBody>
       </p:sp>
-      <mc:AlternateContent xmlns:mc="http://schemas.openxmlformats.org/markup-compatibility/2006">
-        <mc:Choice xmlns:a14="http://schemas.microsoft.com/office/drawing/2010/main" Requires="a14">
+      <mc:AlternateContent xmlns:mc="http://schemas.openxmlformats.org/markup-compatibility/2006" xmlns:a14="http://schemas.microsoft.com/office/drawing/2010/main">
+        <mc:Choice Requires="a14">
           <p:sp>
             <p:nvSpPr>
               <p:cNvPr id="4" name="TextBox 3">
@@ -13074,7 +13121,7 @@
             </p:txBody>
           </p:sp>
         </mc:Choice>
-        <mc:Fallback>
+        <mc:Fallback xmlns="">
           <p:sp>
             <p:nvSpPr>
               <p:cNvPr id="4" name="TextBox 3">
@@ -13745,8 +13792,8 @@
           </a:p>
         </p:txBody>
       </p:sp>
-      <mc:AlternateContent xmlns:mc="http://schemas.openxmlformats.org/markup-compatibility/2006">
-        <mc:Choice xmlns:a14="http://schemas.microsoft.com/office/drawing/2010/main" Requires="a14">
+      <mc:AlternateContent xmlns:mc="http://schemas.openxmlformats.org/markup-compatibility/2006" xmlns:a14="http://schemas.microsoft.com/office/drawing/2010/main">
+        <mc:Choice Requires="a14">
           <p:sp>
             <p:nvSpPr>
               <p:cNvPr id="9" name="TextBox 8">
@@ -14184,7 +14231,7 @@
             </p:txBody>
           </p:sp>
         </mc:Choice>
-        <mc:Fallback>
+        <mc:Fallback xmlns="">
           <p:sp>
             <p:nvSpPr>
               <p:cNvPr id="9" name="TextBox 8">

</xml_diff>